<commit_message>
repository rerorganization, fintal notebook on classification, images
</commit_message>
<xml_diff>
--- a/images/model_workflow.pptx
+++ b/images/model_workflow.pptx
@@ -6,6 +6,7 @@
   </p:sldMasterIdLst>
   <p:sldIdLst>
     <p:sldId id="256" r:id="rId2"/>
+    <p:sldId id="257" r:id="rId3"/>
   </p:sldIdLst>
   <p:sldSz cx="12192000" cy="6858000"/>
   <p:notesSz cx="6858000" cy="9144000"/>
@@ -261,7 +262,7 @@
           <a:p>
             <a:fld id="{01725C61-8291-492E-8129-73E0C60F4F7C}" type="datetimeFigureOut">
               <a:rPr lang="en-DE" smtClean="0"/>
-              <a:t>30/04/2024</a:t>
+              <a:t>02/05/2024</a:t>
             </a:fld>
             <a:endParaRPr lang="en-DE"/>
           </a:p>
@@ -461,7 +462,7 @@
           <a:p>
             <a:fld id="{01725C61-8291-492E-8129-73E0C60F4F7C}" type="datetimeFigureOut">
               <a:rPr lang="en-DE" smtClean="0"/>
-              <a:t>30/04/2024</a:t>
+              <a:t>02/05/2024</a:t>
             </a:fld>
             <a:endParaRPr lang="en-DE"/>
           </a:p>
@@ -671,7 +672,7 @@
           <a:p>
             <a:fld id="{01725C61-8291-492E-8129-73E0C60F4F7C}" type="datetimeFigureOut">
               <a:rPr lang="en-DE" smtClean="0"/>
-              <a:t>30/04/2024</a:t>
+              <a:t>02/05/2024</a:t>
             </a:fld>
             <a:endParaRPr lang="en-DE"/>
           </a:p>
@@ -871,7 +872,7 @@
           <a:p>
             <a:fld id="{01725C61-8291-492E-8129-73E0C60F4F7C}" type="datetimeFigureOut">
               <a:rPr lang="en-DE" smtClean="0"/>
-              <a:t>30/04/2024</a:t>
+              <a:t>02/05/2024</a:t>
             </a:fld>
             <a:endParaRPr lang="en-DE"/>
           </a:p>
@@ -1147,7 +1148,7 @@
           <a:p>
             <a:fld id="{01725C61-8291-492E-8129-73E0C60F4F7C}" type="datetimeFigureOut">
               <a:rPr lang="en-DE" smtClean="0"/>
-              <a:t>30/04/2024</a:t>
+              <a:t>02/05/2024</a:t>
             </a:fld>
             <a:endParaRPr lang="en-DE"/>
           </a:p>
@@ -1415,7 +1416,7 @@
           <a:p>
             <a:fld id="{01725C61-8291-492E-8129-73E0C60F4F7C}" type="datetimeFigureOut">
               <a:rPr lang="en-DE" smtClean="0"/>
-              <a:t>30/04/2024</a:t>
+              <a:t>02/05/2024</a:t>
             </a:fld>
             <a:endParaRPr lang="en-DE"/>
           </a:p>
@@ -1830,7 +1831,7 @@
           <a:p>
             <a:fld id="{01725C61-8291-492E-8129-73E0C60F4F7C}" type="datetimeFigureOut">
               <a:rPr lang="en-DE" smtClean="0"/>
-              <a:t>30/04/2024</a:t>
+              <a:t>02/05/2024</a:t>
             </a:fld>
             <a:endParaRPr lang="en-DE"/>
           </a:p>
@@ -1972,7 +1973,7 @@
           <a:p>
             <a:fld id="{01725C61-8291-492E-8129-73E0C60F4F7C}" type="datetimeFigureOut">
               <a:rPr lang="en-DE" smtClean="0"/>
-              <a:t>30/04/2024</a:t>
+              <a:t>02/05/2024</a:t>
             </a:fld>
             <a:endParaRPr lang="en-DE"/>
           </a:p>
@@ -2085,7 +2086,7 @@
           <a:p>
             <a:fld id="{01725C61-8291-492E-8129-73E0C60F4F7C}" type="datetimeFigureOut">
               <a:rPr lang="en-DE" smtClean="0"/>
-              <a:t>30/04/2024</a:t>
+              <a:t>02/05/2024</a:t>
             </a:fld>
             <a:endParaRPr lang="en-DE"/>
           </a:p>
@@ -2398,7 +2399,7 @@
           <a:p>
             <a:fld id="{01725C61-8291-492E-8129-73E0C60F4F7C}" type="datetimeFigureOut">
               <a:rPr lang="en-DE" smtClean="0"/>
-              <a:t>30/04/2024</a:t>
+              <a:t>02/05/2024</a:t>
             </a:fld>
             <a:endParaRPr lang="en-DE"/>
           </a:p>
@@ -2687,7 +2688,7 @@
           <a:p>
             <a:fld id="{01725C61-8291-492E-8129-73E0C60F4F7C}" type="datetimeFigureOut">
               <a:rPr lang="en-DE" smtClean="0"/>
-              <a:t>30/04/2024</a:t>
+              <a:t>02/05/2024</a:t>
             </a:fld>
             <a:endParaRPr lang="en-DE"/>
           </a:p>
@@ -2930,7 +2931,7 @@
           <a:p>
             <a:fld id="{01725C61-8291-492E-8129-73E0C60F4F7C}" type="datetimeFigureOut">
               <a:rPr lang="en-DE" smtClean="0"/>
-              <a:t>30/04/2024</a:t>
+              <a:t>02/05/2024</a:t>
             </a:fld>
             <a:endParaRPr lang="en-DE"/>
           </a:p>
@@ -4047,7 +4048,7 @@
         </p:blipFill>
         <p:spPr>
           <a:xfrm>
-            <a:off x="3511535" y="7677"/>
+            <a:off x="3511535" y="-1654"/>
             <a:ext cx="1456667" cy="1456667"/>
           </a:xfrm>
           <a:prstGeom prst="rect">
@@ -4158,7 +4159,7 @@
         </p:blipFill>
         <p:spPr bwMode="auto">
           <a:xfrm>
-            <a:off x="2066583" y="1834553"/>
+            <a:off x="2598430" y="1834553"/>
             <a:ext cx="540836" cy="628068"/>
           </a:xfrm>
           <a:prstGeom prst="rect">
@@ -4205,7 +4206,7 @@
         </p:blipFill>
         <p:spPr bwMode="auto">
           <a:xfrm>
-            <a:off x="2664947" y="1851374"/>
+            <a:off x="1965153" y="1851374"/>
             <a:ext cx="557658" cy="611247"/>
           </a:xfrm>
           <a:prstGeom prst="rect">
@@ -4501,6 +4502,631 @@
     <p:extLst>
       <p:ext uri="{BB962C8B-B14F-4D97-AF65-F5344CB8AC3E}">
         <p14:creationId xmlns:p14="http://schemas.microsoft.com/office/powerpoint/2010/main" val="3228518586"/>
+      </p:ext>
+    </p:extLst>
+  </p:cSld>
+  <p:clrMapOvr>
+    <a:masterClrMapping/>
+  </p:clrMapOvr>
+</p:sld>
+</file>
+
+<file path=ppt/slides/slide2.xml><?xml version="1.0" encoding="utf-8"?>
+<p:sld xmlns:a="http://schemas.openxmlformats.org/drawingml/2006/main" xmlns:r="http://schemas.openxmlformats.org/officeDocument/2006/relationships" xmlns:p="http://schemas.openxmlformats.org/presentationml/2006/main">
+  <p:cSld>
+    <p:spTree>
+      <p:nvGrpSpPr>
+        <p:cNvPr id="1" name=""/>
+        <p:cNvGrpSpPr/>
+        <p:nvPr/>
+      </p:nvGrpSpPr>
+      <p:grpSpPr>
+        <a:xfrm>
+          <a:off x="0" y="0"/>
+          <a:ext cx="0" cy="0"/>
+          <a:chOff x="0" y="0"/>
+          <a:chExt cx="0" cy="0"/>
+        </a:xfrm>
+      </p:grpSpPr>
+      <p:cxnSp>
+        <p:nvCxnSpPr>
+          <p:cNvPr id="5" name="Straight Arrow Connector 4">
+            <a:extLst>
+              <a:ext uri="{FF2B5EF4-FFF2-40B4-BE49-F238E27FC236}">
+                <a16:creationId xmlns:a16="http://schemas.microsoft.com/office/drawing/2014/main" id="{A1CCB01A-949E-45F0-A7E4-EF7403FE0C12}"/>
+              </a:ext>
+            </a:extLst>
+          </p:cNvPr>
+          <p:cNvCxnSpPr>
+            <a:cxnSpLocks/>
+            <a:stCxn id="30" idx="2"/>
+            <a:endCxn id="14" idx="0"/>
+          </p:cNvCxnSpPr>
+          <p:nvPr/>
+        </p:nvCxnSpPr>
+        <p:spPr>
+          <a:xfrm>
+            <a:off x="5593702" y="516175"/>
+            <a:ext cx="1" cy="3321253"/>
+          </a:xfrm>
+          <a:prstGeom prst="straightConnector1">
+            <a:avLst/>
+          </a:prstGeom>
+          <a:ln w="25400">
+            <a:headEnd w="lg" len="lg"/>
+            <a:tailEnd type="triangle" w="lg" len="lg"/>
+          </a:ln>
+        </p:spPr>
+        <p:style>
+          <a:lnRef idx="1">
+            <a:schemeClr val="dk1"/>
+          </a:lnRef>
+          <a:fillRef idx="0">
+            <a:schemeClr val="dk1"/>
+          </a:fillRef>
+          <a:effectRef idx="0">
+            <a:schemeClr val="dk1"/>
+          </a:effectRef>
+          <a:fontRef idx="minor">
+            <a:schemeClr val="tx1"/>
+          </a:fontRef>
+        </p:style>
+      </p:cxnSp>
+      <p:sp>
+        <p:nvSpPr>
+          <p:cNvPr id="14" name="Flowchart: Process 13">
+            <a:extLst>
+              <a:ext uri="{FF2B5EF4-FFF2-40B4-BE49-F238E27FC236}">
+                <a16:creationId xmlns:a16="http://schemas.microsoft.com/office/drawing/2014/main" id="{A92200D3-8ACB-46ED-9663-794031FE19BC}"/>
+              </a:ext>
+            </a:extLst>
+          </p:cNvPr>
+          <p:cNvSpPr/>
+          <p:nvPr/>
+        </p:nvSpPr>
+        <p:spPr>
+          <a:xfrm>
+            <a:off x="4757114" y="3837428"/>
+            <a:ext cx="1673177" cy="1118991"/>
+          </a:xfrm>
+          <a:prstGeom prst="flowChartProcess">
+            <a:avLst/>
+          </a:prstGeom>
+          <a:solidFill>
+            <a:schemeClr val="bg1"/>
+          </a:solidFill>
+          <a:ln w="38100">
+            <a:solidFill>
+              <a:schemeClr val="tx1"/>
+            </a:solidFill>
+          </a:ln>
+        </p:spPr>
+        <p:style>
+          <a:lnRef idx="2">
+            <a:schemeClr val="accent1">
+              <a:shade val="50000"/>
+            </a:schemeClr>
+          </a:lnRef>
+          <a:fillRef idx="1">
+            <a:schemeClr val="accent1"/>
+          </a:fillRef>
+          <a:effectRef idx="0">
+            <a:schemeClr val="accent1"/>
+          </a:effectRef>
+          <a:fontRef idx="minor">
+            <a:schemeClr val="lt1"/>
+          </a:fontRef>
+        </p:style>
+        <p:txBody>
+          <a:bodyPr rtlCol="0" anchor="ctr"/>
+          <a:lstStyle/>
+          <a:p>
+            <a:pPr algn="ctr"/>
+            <a:r>
+              <a:rPr lang="en-US" dirty="0">
+                <a:solidFill>
+                  <a:schemeClr val="tx1"/>
+                </a:solidFill>
+              </a:rPr>
+              <a:t>Segment</a:t>
+            </a:r>
+          </a:p>
+          <a:p>
+            <a:pPr algn="ctr"/>
+            <a:r>
+              <a:rPr lang="en-US" dirty="0">
+                <a:solidFill>
+                  <a:schemeClr val="tx1"/>
+                </a:solidFill>
+              </a:rPr>
+              <a:t>Image</a:t>
+            </a:r>
+            <a:endParaRPr lang="en-DE" dirty="0">
+              <a:solidFill>
+                <a:schemeClr val="tx1"/>
+              </a:solidFill>
+            </a:endParaRPr>
+          </a:p>
+        </p:txBody>
+      </p:sp>
+      <p:cxnSp>
+        <p:nvCxnSpPr>
+          <p:cNvPr id="15" name="Straight Arrow Connector 14">
+            <a:extLst>
+              <a:ext uri="{FF2B5EF4-FFF2-40B4-BE49-F238E27FC236}">
+                <a16:creationId xmlns:a16="http://schemas.microsoft.com/office/drawing/2014/main" id="{6C18B755-642B-4B7E-8BE2-7B0C25195ED6}"/>
+              </a:ext>
+            </a:extLst>
+          </p:cNvPr>
+          <p:cNvCxnSpPr>
+            <a:cxnSpLocks/>
+            <a:stCxn id="14" idx="2"/>
+            <a:endCxn id="16" idx="0"/>
+          </p:cNvCxnSpPr>
+          <p:nvPr/>
+        </p:nvCxnSpPr>
+        <p:spPr>
+          <a:xfrm>
+            <a:off x="5593703" y="4956419"/>
+            <a:ext cx="5160" cy="1054302"/>
+          </a:xfrm>
+          <a:prstGeom prst="straightConnector1">
+            <a:avLst/>
+          </a:prstGeom>
+          <a:ln w="25400">
+            <a:headEnd w="lg" len="lg"/>
+            <a:tailEnd type="triangle" w="lg" len="lg"/>
+          </a:ln>
+        </p:spPr>
+        <p:style>
+          <a:lnRef idx="1">
+            <a:schemeClr val="dk1"/>
+          </a:lnRef>
+          <a:fillRef idx="0">
+            <a:schemeClr val="dk1"/>
+          </a:fillRef>
+          <a:effectRef idx="0">
+            <a:schemeClr val="dk1"/>
+          </a:effectRef>
+          <a:fontRef idx="minor">
+            <a:schemeClr val="tx1"/>
+          </a:fontRef>
+        </p:style>
+      </p:cxnSp>
+      <p:sp>
+        <p:nvSpPr>
+          <p:cNvPr id="16" name="TextBox 15">
+            <a:extLst>
+              <a:ext uri="{FF2B5EF4-FFF2-40B4-BE49-F238E27FC236}">
+                <a16:creationId xmlns:a16="http://schemas.microsoft.com/office/drawing/2014/main" id="{A3358A61-2A37-4108-A137-A6629CC42C29}"/>
+              </a:ext>
+            </a:extLst>
+          </p:cNvPr>
+          <p:cNvSpPr txBox="1"/>
+          <p:nvPr/>
+        </p:nvSpPr>
+        <p:spPr>
+          <a:xfrm>
+            <a:off x="4846156" y="6010721"/>
+            <a:ext cx="1505414" cy="369332"/>
+          </a:xfrm>
+          <a:prstGeom prst="rect">
+            <a:avLst/>
+          </a:prstGeom>
+          <a:noFill/>
+        </p:spPr>
+        <p:txBody>
+          <a:bodyPr wrap="square" rtlCol="0">
+            <a:spAutoFit/>
+          </a:bodyPr>
+          <a:lstStyle/>
+          <a:p>
+            <a:pPr algn="ctr"/>
+            <a:r>
+              <a:rPr lang="en-US" dirty="0"/>
+              <a:t>Mask</a:t>
+            </a:r>
+          </a:p>
+        </p:txBody>
+      </p:sp>
+      <p:grpSp>
+        <p:nvGrpSpPr>
+          <p:cNvPr id="21" name="Group 20">
+            <a:extLst>
+              <a:ext uri="{FF2B5EF4-FFF2-40B4-BE49-F238E27FC236}">
+                <a16:creationId xmlns:a16="http://schemas.microsoft.com/office/drawing/2014/main" id="{727881C5-DF5E-4ECD-8F91-F5132F832F25}"/>
+              </a:ext>
+            </a:extLst>
+          </p:cNvPr>
+          <p:cNvGrpSpPr/>
+          <p:nvPr/>
+        </p:nvGrpSpPr>
+        <p:grpSpPr>
+          <a:xfrm>
+            <a:off x="3511535" y="5412487"/>
+            <a:ext cx="1440000" cy="1440000"/>
+            <a:chOff x="2464421" y="5179742"/>
+            <a:chExt cx="1440000" cy="1440000"/>
+          </a:xfrm>
+        </p:grpSpPr>
+        <p:sp>
+          <p:nvSpPr>
+            <p:cNvPr id="17" name="Flowchart: Process 16">
+              <a:extLst>
+                <a:ext uri="{FF2B5EF4-FFF2-40B4-BE49-F238E27FC236}">
+                  <a16:creationId xmlns:a16="http://schemas.microsoft.com/office/drawing/2014/main" id="{D62B129A-4FF0-4A48-A2F9-CD4638EE361A}"/>
+                </a:ext>
+              </a:extLst>
+            </p:cNvPr>
+            <p:cNvSpPr/>
+            <p:nvPr/>
+          </p:nvSpPr>
+          <p:spPr>
+            <a:xfrm>
+              <a:off x="2464421" y="5179742"/>
+              <a:ext cx="1440000" cy="1440000"/>
+            </a:xfrm>
+            <a:prstGeom prst="flowChartProcess">
+              <a:avLst/>
+            </a:prstGeom>
+          </p:spPr>
+          <p:style>
+            <a:lnRef idx="2">
+              <a:schemeClr val="dk1">
+                <a:shade val="50000"/>
+              </a:schemeClr>
+            </a:lnRef>
+            <a:fillRef idx="1">
+              <a:schemeClr val="dk1"/>
+            </a:fillRef>
+            <a:effectRef idx="0">
+              <a:schemeClr val="dk1"/>
+            </a:effectRef>
+            <a:fontRef idx="minor">
+              <a:schemeClr val="lt1"/>
+            </a:fontRef>
+          </p:style>
+          <p:txBody>
+            <a:bodyPr rtlCol="0" anchor="ctr"/>
+            <a:lstStyle/>
+            <a:p>
+              <a:pPr algn="ctr"/>
+              <a:endParaRPr lang="en-DE"/>
+            </a:p>
+          </p:txBody>
+        </p:sp>
+        <p:grpSp>
+          <p:nvGrpSpPr>
+            <p:cNvPr id="20" name="Group 19">
+              <a:extLst>
+                <a:ext uri="{FF2B5EF4-FFF2-40B4-BE49-F238E27FC236}">
+                  <a16:creationId xmlns:a16="http://schemas.microsoft.com/office/drawing/2014/main" id="{F13591B6-8E6E-4798-A6AD-15B7B086F710}"/>
+                </a:ext>
+              </a:extLst>
+            </p:cNvPr>
+            <p:cNvGrpSpPr/>
+            <p:nvPr/>
+          </p:nvGrpSpPr>
+          <p:grpSpPr>
+            <a:xfrm>
+              <a:off x="2877016" y="5503240"/>
+              <a:ext cx="738711" cy="677608"/>
+              <a:chOff x="2877016" y="5503240"/>
+              <a:chExt cx="738711" cy="677608"/>
+            </a:xfrm>
+          </p:grpSpPr>
+          <p:sp>
+            <p:nvSpPr>
+              <p:cNvPr id="18" name="Oval 17">
+                <a:extLst>
+                  <a:ext uri="{FF2B5EF4-FFF2-40B4-BE49-F238E27FC236}">
+                    <a16:creationId xmlns:a16="http://schemas.microsoft.com/office/drawing/2014/main" id="{50448401-BD8E-4A90-B1FD-ED87EAF4CEBD}"/>
+                  </a:ext>
+                </a:extLst>
+              </p:cNvPr>
+              <p:cNvSpPr/>
+              <p:nvPr/>
+            </p:nvSpPr>
+            <p:spPr>
+              <a:xfrm>
+                <a:off x="2877016" y="5503240"/>
+                <a:ext cx="412595" cy="213419"/>
+              </a:xfrm>
+              <a:prstGeom prst="ellipse">
+                <a:avLst/>
+              </a:prstGeom>
+              <a:solidFill>
+                <a:schemeClr val="bg2">
+                  <a:lumMod val="50000"/>
+                </a:schemeClr>
+              </a:solidFill>
+              <a:ln>
+                <a:solidFill>
+                  <a:schemeClr val="bg2">
+                    <a:lumMod val="50000"/>
+                  </a:schemeClr>
+                </a:solidFill>
+              </a:ln>
+            </p:spPr>
+            <p:style>
+              <a:lnRef idx="2">
+                <a:schemeClr val="accent1">
+                  <a:shade val="50000"/>
+                </a:schemeClr>
+              </a:lnRef>
+              <a:fillRef idx="1">
+                <a:schemeClr val="accent1"/>
+              </a:fillRef>
+              <a:effectRef idx="0">
+                <a:schemeClr val="accent1"/>
+              </a:effectRef>
+              <a:fontRef idx="minor">
+                <a:schemeClr val="lt1"/>
+              </a:fontRef>
+            </p:style>
+            <p:txBody>
+              <a:bodyPr rtlCol="0" anchor="ctr"/>
+              <a:lstStyle/>
+              <a:p>
+                <a:pPr algn="ctr"/>
+                <a:endParaRPr lang="en-DE"/>
+              </a:p>
+            </p:txBody>
+          </p:sp>
+          <p:sp>
+            <p:nvSpPr>
+              <p:cNvPr id="19" name="Oval 18">
+                <a:extLst>
+                  <a:ext uri="{FF2B5EF4-FFF2-40B4-BE49-F238E27FC236}">
+                    <a16:creationId xmlns:a16="http://schemas.microsoft.com/office/drawing/2014/main" id="{8FA01FF2-1212-4A97-ADA6-C4C49915F02B}"/>
+                  </a:ext>
+                </a:extLst>
+              </p:cNvPr>
+              <p:cNvSpPr/>
+              <p:nvPr/>
+            </p:nvSpPr>
+            <p:spPr>
+              <a:xfrm rot="4306920">
+                <a:off x="3289611" y="5854732"/>
+                <a:ext cx="412595" cy="239637"/>
+              </a:xfrm>
+              <a:prstGeom prst="ellipse">
+                <a:avLst/>
+              </a:prstGeom>
+              <a:solidFill>
+                <a:schemeClr val="bg1"/>
+              </a:solidFill>
+              <a:ln>
+                <a:solidFill>
+                  <a:schemeClr val="bg2">
+                    <a:lumMod val="50000"/>
+                  </a:schemeClr>
+                </a:solidFill>
+              </a:ln>
+            </p:spPr>
+            <p:style>
+              <a:lnRef idx="2">
+                <a:schemeClr val="accent1">
+                  <a:shade val="50000"/>
+                </a:schemeClr>
+              </a:lnRef>
+              <a:fillRef idx="1">
+                <a:schemeClr val="accent1"/>
+              </a:fillRef>
+              <a:effectRef idx="0">
+                <a:schemeClr val="accent1"/>
+              </a:effectRef>
+              <a:fontRef idx="minor">
+                <a:schemeClr val="lt1"/>
+              </a:fontRef>
+            </p:style>
+            <p:txBody>
+              <a:bodyPr rtlCol="0" anchor="ctr"/>
+              <a:lstStyle/>
+              <a:p>
+                <a:pPr algn="ctr"/>
+                <a:endParaRPr lang="en-DE"/>
+              </a:p>
+            </p:txBody>
+          </p:sp>
+        </p:grpSp>
+      </p:grpSp>
+      <p:sp>
+        <p:nvSpPr>
+          <p:cNvPr id="30" name="TextBox 29">
+            <a:extLst>
+              <a:ext uri="{FF2B5EF4-FFF2-40B4-BE49-F238E27FC236}">
+                <a16:creationId xmlns:a16="http://schemas.microsoft.com/office/drawing/2014/main" id="{A8760565-25F0-4634-8E49-BE29A371A8DA}"/>
+              </a:ext>
+            </a:extLst>
+          </p:cNvPr>
+          <p:cNvSpPr txBox="1"/>
+          <p:nvPr/>
+        </p:nvSpPr>
+        <p:spPr>
+          <a:xfrm>
+            <a:off x="4884994" y="146843"/>
+            <a:ext cx="1417415" cy="369332"/>
+          </a:xfrm>
+          <a:prstGeom prst="rect">
+            <a:avLst/>
+          </a:prstGeom>
+          <a:noFill/>
+        </p:spPr>
+        <p:txBody>
+          <a:bodyPr wrap="square" rtlCol="0">
+            <a:spAutoFit/>
+          </a:bodyPr>
+          <a:lstStyle/>
+          <a:p>
+            <a:pPr algn="ctr"/>
+            <a:r>
+              <a:rPr lang="en-US" dirty="0"/>
+              <a:t>Input Image</a:t>
+            </a:r>
+          </a:p>
+        </p:txBody>
+      </p:sp>
+      <p:pic>
+        <p:nvPicPr>
+          <p:cNvPr id="36" name="Picture 35">
+            <a:extLst>
+              <a:ext uri="{FF2B5EF4-FFF2-40B4-BE49-F238E27FC236}">
+                <a16:creationId xmlns:a16="http://schemas.microsoft.com/office/drawing/2014/main" id="{48DDBFA3-5BAD-4369-949B-EF2D943BF93E}"/>
+              </a:ext>
+            </a:extLst>
+          </p:cNvPr>
+          <p:cNvPicPr>
+            <a:picLocks noChangeAspect="1"/>
+          </p:cNvPicPr>
+          <p:nvPr/>
+        </p:nvPicPr>
+        <p:blipFill>
+          <a:blip r:embed="rId2">
+            <a:extLst>
+              <a:ext uri="{28A0092B-C50C-407E-A947-70E740481C1C}">
+                <a14:useLocalDpi xmlns:a14="http://schemas.microsoft.com/office/drawing/2010/main" val="0"/>
+              </a:ext>
+            </a:extLst>
+          </a:blip>
+          <a:stretch>
+            <a:fillRect/>
+          </a:stretch>
+        </p:blipFill>
+        <p:spPr>
+          <a:xfrm>
+            <a:off x="3511535" y="-1654"/>
+            <a:ext cx="1456667" cy="1456667"/>
+          </a:xfrm>
+          <a:prstGeom prst="rect">
+            <a:avLst/>
+          </a:prstGeom>
+        </p:spPr>
+      </p:pic>
+      <p:sp>
+        <p:nvSpPr>
+          <p:cNvPr id="38" name="TextBox 37">
+            <a:extLst>
+              <a:ext uri="{FF2B5EF4-FFF2-40B4-BE49-F238E27FC236}">
+                <a16:creationId xmlns:a16="http://schemas.microsoft.com/office/drawing/2014/main" id="{863885FC-2074-4A28-A23F-FDCBAE2F3144}"/>
+              </a:ext>
+            </a:extLst>
+          </p:cNvPr>
+          <p:cNvSpPr txBox="1"/>
+          <p:nvPr/>
+        </p:nvSpPr>
+        <p:spPr>
+          <a:xfrm>
+            <a:off x="1654417" y="3883592"/>
+            <a:ext cx="1879419" cy="369332"/>
+          </a:xfrm>
+          <a:prstGeom prst="rect">
+            <a:avLst/>
+          </a:prstGeom>
+          <a:noFill/>
+        </p:spPr>
+        <p:txBody>
+          <a:bodyPr wrap="square" rtlCol="0">
+            <a:spAutoFit/>
+          </a:bodyPr>
+          <a:lstStyle/>
+          <a:p>
+            <a:pPr algn="ctr"/>
+            <a:r>
+              <a:rPr lang="en-US" dirty="0" err="1"/>
+              <a:t>SegFormer</a:t>
+            </a:r>
+            <a:endParaRPr lang="en-US" dirty="0"/>
+          </a:p>
+        </p:txBody>
+      </p:sp>
+      <p:pic>
+        <p:nvPicPr>
+          <p:cNvPr id="1032" name="Picture 8" descr="pytorch-logo – Terra Incognita">
+            <a:extLst>
+              <a:ext uri="{FF2B5EF4-FFF2-40B4-BE49-F238E27FC236}">
+                <a16:creationId xmlns:a16="http://schemas.microsoft.com/office/drawing/2014/main" id="{5E69F3CD-304E-4EF7-8439-CB237A11C02F}"/>
+              </a:ext>
+            </a:extLst>
+          </p:cNvPr>
+          <p:cNvPicPr>
+            <a:picLocks noChangeAspect="1" noChangeArrowheads="1"/>
+          </p:cNvPicPr>
+          <p:nvPr/>
+        </p:nvPicPr>
+        <p:blipFill>
+          <a:blip r:embed="rId3">
+            <a:extLst>
+              <a:ext uri="{28A0092B-C50C-407E-A947-70E740481C1C}">
+                <a14:useLocalDpi xmlns:a14="http://schemas.microsoft.com/office/drawing/2010/main" val="0"/>
+              </a:ext>
+            </a:extLst>
+          </a:blip>
+          <a:srcRect/>
+          <a:stretch>
+            <a:fillRect/>
+          </a:stretch>
+        </p:blipFill>
+        <p:spPr bwMode="auto">
+          <a:xfrm>
+            <a:off x="1850277" y="4124013"/>
+            <a:ext cx="942923" cy="942923"/>
+          </a:xfrm>
+          <a:prstGeom prst="rect">
+            <a:avLst/>
+          </a:prstGeom>
+          <a:noFill/>
+          <a:extLst>
+            <a:ext uri="{909E8E84-426E-40DD-AFC4-6F175D3DCCD1}">
+              <a14:hiddenFill xmlns:a14="http://schemas.microsoft.com/office/drawing/2010/main">
+                <a:solidFill>
+                  <a:srgbClr val="FFFFFF"/>
+                </a:solidFill>
+              </a14:hiddenFill>
+            </a:ext>
+          </a:extLst>
+        </p:spPr>
+      </p:pic>
+      <p:pic>
+        <p:nvPicPr>
+          <p:cNvPr id="40" name="Picture 39">
+            <a:extLst>
+              <a:ext uri="{FF2B5EF4-FFF2-40B4-BE49-F238E27FC236}">
+                <a16:creationId xmlns:a16="http://schemas.microsoft.com/office/drawing/2014/main" id="{4EC429A5-E742-4775-A126-FF8EE272850F}"/>
+              </a:ext>
+            </a:extLst>
+          </p:cNvPr>
+          <p:cNvPicPr>
+            <a:picLocks noChangeAspect="1"/>
+          </p:cNvPicPr>
+          <p:nvPr/>
+        </p:nvPicPr>
+        <p:blipFill>
+          <a:blip r:embed="rId4">
+            <a:extLst>
+              <a:ext uri="{28A0092B-C50C-407E-A947-70E740481C1C}">
+                <a14:useLocalDpi xmlns:a14="http://schemas.microsoft.com/office/drawing/2010/main" val="0"/>
+              </a:ext>
+            </a:extLst>
+          </a:blip>
+          <a:stretch>
+            <a:fillRect/>
+          </a:stretch>
+        </p:blipFill>
+        <p:spPr>
+          <a:xfrm>
+            <a:off x="2555846" y="4230662"/>
+            <a:ext cx="765084" cy="765084"/>
+          </a:xfrm>
+          <a:prstGeom prst="rect">
+            <a:avLst/>
+          </a:prstGeom>
+        </p:spPr>
+      </p:pic>
+    </p:spTree>
+    <p:extLst>
+      <p:ext uri="{BB962C8B-B14F-4D97-AF65-F5344CB8AC3E}">
+        <p14:creationId xmlns:p14="http://schemas.microsoft.com/office/powerpoint/2010/main" val="1914836437"/>
       </p:ext>
     </p:extLst>
   </p:cSld>

</xml_diff>